<commit_message>
Bug gelöst: Person kann nach Verwendung der Searchbar wieder gelöscht werden
</commit_message>
<xml_diff>
--- a/Präsentation_Abschlusspräsentation cm.pptx
+++ b/Präsentation_Abschlusspräsentation cm.pptx
@@ -154,7 +154,7 @@
       </p15:notesGuideLst>
     </p:ext>
     <p:ext uri="http://customooxmlschemas.google.com/">
-      <go:slidesCustomData xmlns:go="http://customooxmlschemas.google.com/" xmlns:ahyp="http://schemas.microsoft.com/office/drawing/2018/hyperlinkcolor" xmlns:p15="http://schemas.microsoft.com/office/powerpoint/2012/main" xmlns:p14="http://schemas.microsoft.com/office/powerpoint/2010/main" xmlns:com="http://schemas.openxmlformats.org/drawingml/2006/compatibility" xmlns:pvml="urn:schemas-microsoft-com:office:powerpoint" xmlns:v="urn:schemas-microsoft-com:vml" xmlns:o="urn:schemas-microsoft-com:office:office" xmlns:dgm="http://schemas.openxmlformats.org/drawingml/2006/diagram" xmlns:c="http://schemas.openxmlformats.org/drawingml/2006/chart" xmlns:mv="urn:schemas-microsoft-com:mac:vml" xmlns:mc="http://schemas.openxmlformats.org/markup-compatibility/2006" xmlns="" r:id="rId15" roundtripDataSignature="AMtx7miRQattAhzxIfQ/lko6APuiIfQfJw=="/>
+      <go:slidesCustomData xmlns="" xmlns:mc="http://schemas.openxmlformats.org/markup-compatibility/2006" xmlns:mv="urn:schemas-microsoft-com:mac:vml" xmlns:c="http://schemas.openxmlformats.org/drawingml/2006/chart" xmlns:dgm="http://schemas.openxmlformats.org/drawingml/2006/diagram" xmlns:o="urn:schemas-microsoft-com:office:office" xmlns:v="urn:schemas-microsoft-com:vml" xmlns:pvml="urn:schemas-microsoft-com:office:powerpoint" xmlns:com="http://schemas.openxmlformats.org/drawingml/2006/compatibility" xmlns:p14="http://schemas.microsoft.com/office/powerpoint/2010/main" xmlns:p15="http://schemas.microsoft.com/office/powerpoint/2012/main" xmlns:ahyp="http://schemas.microsoft.com/office/drawing/2018/hyperlinkcolor" xmlns:go="http://customooxmlschemas.google.com/" r:id="rId15" roundtripDataSignature="AMtx7miRQattAhzxIfQ/lko6APuiIfQfJw=="/>
     </p:ext>
   </p:extLst>
 </p:presentation>
@@ -163,7 +163,7 @@
 <file path=ppt/revisionInfo.xml><?xml version="1.0" encoding="utf-8"?>
 <p1510:revInfo xmlns:a="http://schemas.openxmlformats.org/drawingml/2006/main" xmlns:r="http://schemas.openxmlformats.org/officeDocument/2006/relationships" xmlns:p1510="http://schemas.microsoft.com/office/powerpoint/2015/10/main">
   <p1510:revLst>
-    <p1510:client id="{DFD37377-3CF9-41A8-B394-D515D125A291}" v="91" dt="2022-07-06T12:45:11.215"/>
+    <p1510:client id="{78D215CD-699D-459C-924B-8078EEE71CBA}" v="26" dt="2022-07-10T10:56:46.445"/>
   </p1510:revLst>
 </p1510:revInfo>
 </file>
@@ -173,10 +173,71 @@
   <pc:docChgLst>
     <pc:chgData name="Christian Müller" userId="08f60beff09ab272" providerId="LiveId" clId="{78D215CD-699D-459C-924B-8078EEE71CBA}"/>
     <pc:docChg chg="custSel delSld modSld">
-      <pc:chgData name="Christian Müller" userId="08f60beff09ab272" providerId="LiveId" clId="{78D215CD-699D-459C-924B-8078EEE71CBA}" dt="2022-07-06T18:49:20.009" v="1" actId="47"/>
+      <pc:chgData name="Christian Müller" userId="08f60beff09ab272" providerId="LiveId" clId="{78D215CD-699D-459C-924B-8078EEE71CBA}" dt="2022-07-10T11:05:41.418" v="101" actId="20577"/>
       <pc:docMkLst>
         <pc:docMk/>
       </pc:docMkLst>
+      <pc:sldChg chg="delSp">
+        <pc:chgData name="Christian Müller" userId="08f60beff09ab272" providerId="LiveId" clId="{78D215CD-699D-459C-924B-8078EEE71CBA}" dt="2022-07-10T10:53:43.852" v="47" actId="21"/>
+        <pc:sldMkLst>
+          <pc:docMk/>
+          <pc:sldMk cId="0" sldId="256"/>
+        </pc:sldMkLst>
+        <pc:picChg chg="del">
+          <ac:chgData name="Christian Müller" userId="08f60beff09ab272" providerId="LiveId" clId="{78D215CD-699D-459C-924B-8078EEE71CBA}" dt="2022-07-10T10:53:43.852" v="47" actId="21"/>
+          <ac:picMkLst>
+            <pc:docMk/>
+            <pc:sldMk cId="0" sldId="256"/>
+            <ac:picMk id="3" creationId="{0FD82ED5-0B0E-73EF-E9F3-D74C04F1BB17}"/>
+          </ac:picMkLst>
+        </pc:picChg>
+        <pc:picChg chg="del">
+          <ac:chgData name="Christian Müller" userId="08f60beff09ab272" providerId="LiveId" clId="{78D215CD-699D-459C-924B-8078EEE71CBA}" dt="2022-07-10T10:53:43.852" v="47" actId="21"/>
+          <ac:picMkLst>
+            <pc:docMk/>
+            <pc:sldMk cId="0" sldId="256"/>
+            <ac:picMk id="15" creationId="{8EF7F3E6-D489-0B2E-EBC7-70A069735829}"/>
+          </ac:picMkLst>
+        </pc:picChg>
+        <pc:picChg chg="del">
+          <ac:chgData name="Christian Müller" userId="08f60beff09ab272" providerId="LiveId" clId="{78D215CD-699D-459C-924B-8078EEE71CBA}" dt="2022-07-10T10:53:43.852" v="47" actId="21"/>
+          <ac:picMkLst>
+            <pc:docMk/>
+            <pc:sldMk cId="0" sldId="256"/>
+            <ac:picMk id="1026" creationId="{9FDD5306-3379-C6A2-47A6-7A01EBB678EE}"/>
+          </ac:picMkLst>
+        </pc:picChg>
+      </pc:sldChg>
+      <pc:sldChg chg="modSp">
+        <pc:chgData name="Christian Müller" userId="08f60beff09ab272" providerId="LiveId" clId="{78D215CD-699D-459C-924B-8078EEE71CBA}" dt="2022-07-10T10:56:46.445" v="98" actId="20577"/>
+        <pc:sldMkLst>
+          <pc:docMk/>
+          <pc:sldMk cId="0" sldId="257"/>
+        </pc:sldMkLst>
+        <pc:graphicFrameChg chg="mod">
+          <ac:chgData name="Christian Müller" userId="08f60beff09ab272" providerId="LiveId" clId="{78D215CD-699D-459C-924B-8078EEE71CBA}" dt="2022-07-10T10:56:46.445" v="98" actId="20577"/>
+          <ac:graphicFrameMkLst>
+            <pc:docMk/>
+            <pc:sldMk cId="0" sldId="257"/>
+            <ac:graphicFrameMk id="1032" creationId="{94253EAB-3168-97B5-7F2B-61839D228559}"/>
+          </ac:graphicFrameMkLst>
+        </pc:graphicFrameChg>
+      </pc:sldChg>
+      <pc:sldChg chg="modSp mod">
+        <pc:chgData name="Christian Müller" userId="08f60beff09ab272" providerId="LiveId" clId="{78D215CD-699D-459C-924B-8078EEE71CBA}" dt="2022-07-10T11:05:41.418" v="101" actId="20577"/>
+        <pc:sldMkLst>
+          <pc:docMk/>
+          <pc:sldMk cId="0" sldId="262"/>
+        </pc:sldMkLst>
+        <pc:spChg chg="mod">
+          <ac:chgData name="Christian Müller" userId="08f60beff09ab272" providerId="LiveId" clId="{78D215CD-699D-459C-924B-8078EEE71CBA}" dt="2022-07-10T11:05:41.418" v="101" actId="20577"/>
+          <ac:spMkLst>
+            <pc:docMk/>
+            <pc:sldMk cId="0" sldId="262"/>
+            <ac:spMk id="125" creationId="{00000000-0000-0000-0000-000000000000}"/>
+          </ac:spMkLst>
+        </pc:spChg>
+      </pc:sldChg>
       <pc:sldChg chg="delSp del mod">
         <pc:chgData name="Christian Müller" userId="08f60beff09ab272" providerId="LiveId" clId="{78D215CD-699D-459C-924B-8078EEE71CBA}" dt="2022-07-06T18:49:20.009" v="1" actId="47"/>
         <pc:sldMkLst>
@@ -189,6 +250,68 @@
             <pc:docMk/>
             <pc:sldMk cId="1995551960" sldId="267"/>
             <ac:picMk id="7" creationId="{94D78AD1-4D23-9325-0DDA-75949B7F090D}"/>
+          </ac:picMkLst>
+        </pc:picChg>
+      </pc:sldChg>
+      <pc:sldChg chg="addSp modSp mod">
+        <pc:chgData name="Christian Müller" userId="08f60beff09ab272" providerId="LiveId" clId="{78D215CD-699D-459C-924B-8078EEE71CBA}" dt="2022-07-10T10:54:37.624" v="57" actId="1076"/>
+        <pc:sldMkLst>
+          <pc:docMk/>
+          <pc:sldMk cId="2466425323" sldId="269"/>
+        </pc:sldMkLst>
+        <pc:picChg chg="add mod">
+          <ac:chgData name="Christian Müller" userId="08f60beff09ab272" providerId="LiveId" clId="{78D215CD-699D-459C-924B-8078EEE71CBA}" dt="2022-07-10T10:54:37.624" v="57" actId="1076"/>
+          <ac:picMkLst>
+            <pc:docMk/>
+            <pc:sldMk cId="2466425323" sldId="269"/>
+            <ac:picMk id="8" creationId="{CEB6B58C-75EE-E695-DCD5-FF99A2638EDD}"/>
+          </ac:picMkLst>
+        </pc:picChg>
+        <pc:picChg chg="add mod">
+          <ac:chgData name="Christian Müller" userId="08f60beff09ab272" providerId="LiveId" clId="{78D215CD-699D-459C-924B-8078EEE71CBA}" dt="2022-07-10T10:54:20.335" v="55" actId="1076"/>
+          <ac:picMkLst>
+            <pc:docMk/>
+            <pc:sldMk cId="2466425323" sldId="269"/>
+            <ac:picMk id="9" creationId="{4E2435C0-06C4-E247-CBB7-BCFE1324C17C}"/>
+          </ac:picMkLst>
+        </pc:picChg>
+        <pc:picChg chg="add mod">
+          <ac:chgData name="Christian Müller" userId="08f60beff09ab272" providerId="LiveId" clId="{78D215CD-699D-459C-924B-8078EEE71CBA}" dt="2022-07-10T10:54:14.350" v="53" actId="1076"/>
+          <ac:picMkLst>
+            <pc:docMk/>
+            <pc:sldMk cId="2466425323" sldId="269"/>
+            <ac:picMk id="12" creationId="{78B9A693-234E-05A0-6D44-ECB82486F165}"/>
+          </ac:picMkLst>
+        </pc:picChg>
+      </pc:sldChg>
+      <pc:sldChg chg="addSp modSp mod">
+        <pc:chgData name="Christian Müller" userId="08f60beff09ab272" providerId="LiveId" clId="{78D215CD-699D-459C-924B-8078EEE71CBA}" dt="2022-07-10T10:52:12.017" v="46" actId="790"/>
+        <pc:sldMkLst>
+          <pc:docMk/>
+          <pc:sldMk cId="465840193" sldId="273"/>
+        </pc:sldMkLst>
+        <pc:spChg chg="mod">
+          <ac:chgData name="Christian Müller" userId="08f60beff09ab272" providerId="LiveId" clId="{78D215CD-699D-459C-924B-8078EEE71CBA}" dt="2022-07-10T10:52:12.017" v="46" actId="790"/>
+          <ac:spMkLst>
+            <pc:docMk/>
+            <pc:sldMk cId="465840193" sldId="273"/>
+            <ac:spMk id="11" creationId="{599712E7-AC5E-1B87-058E-505298901780}"/>
+          </ac:spMkLst>
+        </pc:spChg>
+        <pc:picChg chg="add mod">
+          <ac:chgData name="Christian Müller" userId="08f60beff09ab272" providerId="LiveId" clId="{78D215CD-699D-459C-924B-8078EEE71CBA}" dt="2022-07-10T10:50:59.471" v="32" actId="1076"/>
+          <ac:picMkLst>
+            <pc:docMk/>
+            <pc:sldMk cId="465840193" sldId="273"/>
+            <ac:picMk id="3" creationId="{43EBC877-8224-21BE-9134-527EFA1CC66D}"/>
+          </ac:picMkLst>
+        </pc:picChg>
+        <pc:picChg chg="add mod">
+          <ac:chgData name="Christian Müller" userId="08f60beff09ab272" providerId="LiveId" clId="{78D215CD-699D-459C-924B-8078EEE71CBA}" dt="2022-07-10T10:51:17.412" v="40" actId="1076"/>
+          <ac:picMkLst>
+            <pc:docMk/>
+            <pc:sldMk cId="465840193" sldId="273"/>
+            <ac:picMk id="5" creationId="{EF6BFA6F-FC5F-AEF5-4BFD-8787E2CDB339}"/>
           </ac:picMkLst>
         </pc:picChg>
       </pc:sldChg>
@@ -948,7 +1071,7 @@
 <dgm:dataModel xmlns:dgm="http://schemas.openxmlformats.org/drawingml/2006/diagram" xmlns:a="http://schemas.openxmlformats.org/drawingml/2006/main">
   <dgm:ptLst>
     <dgm:pt modelId="{ED869F20-208D-4B4A-A6E1-F2343F981E6D}" type="doc">
-      <dgm:prSet loTypeId="urn:microsoft.com/office/officeart/2008/layout/LinedList" loCatId="list" qsTypeId="urn:microsoft.com/office/officeart/2005/8/quickstyle/simple1" qsCatId="simple" csTypeId="urn:microsoft.com/office/officeart/2005/8/colors/accent1_2" csCatId="accent1"/>
+      <dgm:prSet loTypeId="urn:microsoft.com/office/officeart/2008/layout/LinedList" loCatId="list" qsTypeId="urn:microsoft.com/office/officeart/2005/8/quickstyle/simple1" qsCatId="simple" csTypeId="urn:microsoft.com/office/officeart/2005/8/colors/accent1_2" csCatId="accent1" phldr="1"/>
       <dgm:spPr/>
       <dgm:t>
         <a:bodyPr/>
@@ -1003,10 +1126,10 @@
         <a:lstStyle/>
         <a:p>
           <a:r>
-            <a:rPr lang="de-DE"/>
+            <a:rPr lang="de-DE" dirty="0"/>
             <a:t>Problemstellung</a:t>
           </a:r>
-          <a:endParaRPr lang="en-US"/>
+          <a:endParaRPr lang="en-US" dirty="0"/>
         </a:p>
       </dgm:t>
     </dgm:pt>
@@ -1040,10 +1163,10 @@
         <a:lstStyle/>
         <a:p>
           <a:r>
-            <a:rPr lang="de-DE"/>
+            <a:rPr lang="de-DE" dirty="0"/>
             <a:t>Lösungsansatz</a:t>
           </a:r>
-          <a:endParaRPr lang="en-US"/>
+          <a:endParaRPr lang="en-US" dirty="0"/>
         </a:p>
       </dgm:t>
     </dgm:pt>
@@ -1077,10 +1200,10 @@
         <a:lstStyle/>
         <a:p>
           <a:r>
-            <a:rPr lang="de-CH"/>
-            <a:t>Demo Website</a:t>
+            <a:rPr lang="de-CH" dirty="0"/>
+            <a:t>App Demo</a:t>
           </a:r>
-          <a:endParaRPr lang="en-US"/>
+          <a:endParaRPr lang="en-US" dirty="0"/>
         </a:p>
       </dgm:t>
     </dgm:pt>
@@ -1114,10 +1237,10 @@
         <a:lstStyle/>
         <a:p>
           <a:r>
-            <a:rPr lang="de-DE"/>
+            <a:rPr lang="de-DE" dirty="0"/>
             <a:t>Herausforderungen</a:t>
           </a:r>
-          <a:endParaRPr lang="en-US"/>
+          <a:endParaRPr lang="en-US" dirty="0"/>
         </a:p>
       </dgm:t>
     </dgm:pt>
@@ -1151,10 +1274,10 @@
         <a:lstStyle/>
         <a:p>
           <a:r>
-            <a:rPr lang="de-DE"/>
+            <a:rPr lang="de-DE" dirty="0"/>
             <a:t>Abschluss </a:t>
           </a:r>
-          <a:endParaRPr lang="en-US"/>
+          <a:endParaRPr lang="en-US" dirty="0"/>
         </a:p>
       </dgm:t>
     </dgm:pt>
@@ -1553,10 +1676,10 @@
             <a:buNone/>
           </a:pPr>
           <a:r>
-            <a:rPr lang="de-DE" sz="3100" kern="1200"/>
+            <a:rPr lang="de-DE" sz="3100" kern="1200" dirty="0"/>
             <a:t>Problemstellung</a:t>
           </a:r>
-          <a:endParaRPr lang="en-US" sz="3100" kern="1200"/>
+          <a:endParaRPr lang="en-US" sz="3100" kern="1200" dirty="0"/>
         </a:p>
       </dsp:txBody>
       <dsp:txXfrm>
@@ -1663,10 +1786,10 @@
             <a:buNone/>
           </a:pPr>
           <a:r>
-            <a:rPr lang="de-DE" sz="3100" kern="1200"/>
+            <a:rPr lang="de-DE" sz="3100" kern="1200" dirty="0"/>
             <a:t>Lösungsansatz</a:t>
           </a:r>
-          <a:endParaRPr lang="en-US" sz="3100" kern="1200"/>
+          <a:endParaRPr lang="en-US" sz="3100" kern="1200" dirty="0"/>
         </a:p>
       </dsp:txBody>
       <dsp:txXfrm>
@@ -1773,10 +1896,10 @@
             <a:buNone/>
           </a:pPr>
           <a:r>
-            <a:rPr lang="de-CH" sz="3100" kern="1200"/>
-            <a:t>Demo Website</a:t>
+            <a:rPr lang="de-CH" sz="3100" kern="1200" dirty="0"/>
+            <a:t>App Demo</a:t>
           </a:r>
-          <a:endParaRPr lang="en-US" sz="3100" kern="1200"/>
+          <a:endParaRPr lang="en-US" sz="3100" kern="1200" dirty="0"/>
         </a:p>
       </dsp:txBody>
       <dsp:txXfrm>
@@ -1883,10 +2006,10 @@
             <a:buNone/>
           </a:pPr>
           <a:r>
-            <a:rPr lang="de-DE" sz="3100" kern="1200"/>
+            <a:rPr lang="de-DE" sz="3100" kern="1200" dirty="0"/>
             <a:t>Herausforderungen</a:t>
           </a:r>
-          <a:endParaRPr lang="en-US" sz="3100" kern="1200"/>
+          <a:endParaRPr lang="en-US" sz="3100" kern="1200" dirty="0"/>
         </a:p>
       </dsp:txBody>
       <dsp:txXfrm>
@@ -1993,10 +2116,10 @@
             <a:buNone/>
           </a:pPr>
           <a:r>
-            <a:rPr lang="de-DE" sz="3100" kern="1200"/>
+            <a:rPr lang="de-DE" sz="3100" kern="1200" dirty="0"/>
             <a:t>Abschluss </a:t>
           </a:r>
-          <a:endParaRPr lang="en-US" sz="3100" kern="1200"/>
+          <a:endParaRPr lang="en-US" sz="3100" kern="1200" dirty="0"/>
         </a:p>
       </dsp:txBody>
       <dsp:txXfrm>
@@ -4752,7 +4875,7 @@
               </a:spcAft>
               <a:buNone/>
             </a:pPr>
-            <a:endParaRPr/>
+            <a:endParaRPr dirty="0"/>
           </a:p>
         </p:txBody>
       </p:sp>
@@ -4911,7 +5034,7 @@
               </a:spcAft>
               <a:buNone/>
             </a:pPr>
-            <a:endParaRPr/>
+            <a:endParaRPr dirty="0"/>
           </a:p>
         </p:txBody>
       </p:sp>
@@ -4957,7 +5080,7 @@
               <a:rPr lang="de-CH"/>
               <a:t>2</a:t>
             </a:fld>
-            <a:endParaRPr/>
+            <a:endParaRPr dirty="0"/>
           </a:p>
         </p:txBody>
       </p:sp>
@@ -5075,7 +5198,7 @@
               </a:spcAft>
               <a:buNone/>
             </a:pPr>
-            <a:endParaRPr/>
+            <a:endParaRPr dirty="0"/>
           </a:p>
         </p:txBody>
       </p:sp>
@@ -5121,7 +5244,7 @@
               <a:rPr lang="de-CH"/>
               <a:t>3</a:t>
             </a:fld>
-            <a:endParaRPr/>
+            <a:endParaRPr dirty="0"/>
           </a:p>
         </p:txBody>
       </p:sp>
@@ -13388,7 +13511,7 @@
           <a:p>
             <a:pPr marL="0" indent="0" algn="ctr"/>
             <a:r>
-              <a:rPr lang="de-CH"/>
+              <a:rPr lang="de-CH" dirty="0"/>
               <a:t>Fach: Mobile App Entwicklung</a:t>
             </a:r>
           </a:p>
@@ -13446,106 +13569,12 @@
               <a:buSzPts val="2000"/>
             </a:pPr>
             <a:r>
-              <a:rPr lang="de-CH" sz="1400" b="0"/>
+              <a:rPr lang="de-CH" sz="1400" b="0" dirty="0"/>
               <a:t>Präsentation von C. Müller</a:t>
             </a:r>
-            <a:endParaRPr lang="de-CH" sz="1400" b="0" dirty="0"/>
           </a:p>
         </p:txBody>
       </p:sp>
-      <p:pic>
-        <p:nvPicPr>
-          <p:cNvPr id="1026" name="Picture 2" descr="sprinter">
-            <a:extLst>
-              <a:ext uri="{FF2B5EF4-FFF2-40B4-BE49-F238E27FC236}">
-                <a16:creationId xmlns:a16="http://schemas.microsoft.com/office/drawing/2014/main" id="{9FDD5306-3379-C6A2-47A6-7A01EBB678EE}"/>
-              </a:ext>
-            </a:extLst>
-          </p:cNvPr>
-          <p:cNvPicPr>
-            <a:picLocks noChangeAspect="1" noChangeArrowheads="1"/>
-          </p:cNvPicPr>
-          <p:nvPr/>
-        </p:nvPicPr>
-        <p:blipFill>
-          <a:blip r:embed="rId3">
-            <a:extLst>
-              <a:ext uri="{28A0092B-C50C-407E-A947-70E740481C1C}">
-                <a14:useLocalDpi xmlns:a14="http://schemas.microsoft.com/office/drawing/2010/main" val="0"/>
-              </a:ext>
-            </a:extLst>
-          </a:blip>
-          <a:srcRect/>
-          <a:stretch>
-            <a:fillRect/>
-          </a:stretch>
-        </p:blipFill>
-        <p:spPr bwMode="auto">
-          <a:xfrm>
-            <a:off x="1179444" y="3201504"/>
-            <a:ext cx="1832116" cy="1412262"/>
-          </a:xfrm>
-          <a:prstGeom prst="rect">
-            <a:avLst/>
-          </a:prstGeom>
-          <a:noFill/>
-          <a:extLst>
-            <a:ext uri="{909E8E84-426E-40DD-AFC4-6F175D3DCCD1}">
-              <a14:hiddenFill xmlns:a14="http://schemas.microsoft.com/office/drawing/2010/main">
-                <a:solidFill>
-                  <a:srgbClr val="FFFFFF"/>
-                </a:solidFill>
-              </a14:hiddenFill>
-            </a:ext>
-          </a:extLst>
-        </p:spPr>
-      </p:pic>
-      <p:pic>
-        <p:nvPicPr>
-          <p:cNvPr id="3" name="Grafik 2">
-            <a:extLst>
-              <a:ext uri="{FF2B5EF4-FFF2-40B4-BE49-F238E27FC236}">
-                <a16:creationId xmlns:a16="http://schemas.microsoft.com/office/drawing/2014/main" id="{0FD82ED5-0B0E-73EF-E9F3-D74C04F1BB17}"/>
-              </a:ext>
-            </a:extLst>
-          </p:cNvPr>
-          <p:cNvPicPr>
-            <a:picLocks noChangeAspect="1"/>
-          </p:cNvPicPr>
-          <p:nvPr/>
-        </p:nvPicPr>
-        <p:blipFill>
-          <a:blip r:embed="rId4"/>
-          <a:stretch>
-            <a:fillRect/>
-          </a:stretch>
-        </p:blipFill>
-        <p:spPr>
-          <a:xfrm>
-            <a:off x="1990925" y="4957398"/>
-            <a:ext cx="636008" cy="1448686"/>
-          </a:xfrm>
-          <a:prstGeom prst="round2DiagRect">
-            <a:avLst>
-              <a:gd name="adj1" fmla="val 16667"/>
-              <a:gd name="adj2" fmla="val 0"/>
-            </a:avLst>
-          </a:prstGeom>
-          <a:ln w="88900" cap="sq">
-            <a:solidFill>
-              <a:srgbClr val="FFFFFF"/>
-            </a:solidFill>
-            <a:miter lim="800000"/>
-          </a:ln>
-          <a:effectLst>
-            <a:outerShdw blurRad="254000" algn="tl" rotWithShape="0">
-              <a:srgbClr val="000000">
-                <a:alpha val="43000"/>
-              </a:srgbClr>
-            </a:outerShdw>
-          </a:effectLst>
-        </p:spPr>
-      </p:pic>
       <p:pic>
         <p:nvPicPr>
           <p:cNvPr id="9" name="Grafik 8">
@@ -13561,7 +13590,7 @@
           <p:nvPr/>
         </p:nvPicPr>
         <p:blipFill>
-          <a:blip r:embed="rId5"/>
+          <a:blip r:embed="rId3"/>
           <a:stretch>
             <a:fillRect/>
           </a:stretch>
@@ -13570,52 +13599,6 @@
           <a:xfrm>
             <a:off x="3762873" y="3348675"/>
             <a:ext cx="3167652" cy="3057409"/>
-          </a:xfrm>
-          <a:prstGeom prst="round2DiagRect">
-            <a:avLst>
-              <a:gd name="adj1" fmla="val 16667"/>
-              <a:gd name="adj2" fmla="val 0"/>
-            </a:avLst>
-          </a:prstGeom>
-          <a:ln w="88900" cap="sq">
-            <a:solidFill>
-              <a:srgbClr val="FFFFFF"/>
-            </a:solidFill>
-            <a:miter lim="800000"/>
-          </a:ln>
-          <a:effectLst>
-            <a:outerShdw blurRad="254000" algn="tl" rotWithShape="0">
-              <a:srgbClr val="000000">
-                <a:alpha val="43000"/>
-              </a:srgbClr>
-            </a:outerShdw>
-          </a:effectLst>
-        </p:spPr>
-      </p:pic>
-      <p:pic>
-        <p:nvPicPr>
-          <p:cNvPr id="15" name="Grafik 14">
-            <a:extLst>
-              <a:ext uri="{FF2B5EF4-FFF2-40B4-BE49-F238E27FC236}">
-                <a16:creationId xmlns:a16="http://schemas.microsoft.com/office/drawing/2014/main" id="{8EF7F3E6-D489-0B2E-EBC7-70A069735829}"/>
-              </a:ext>
-            </a:extLst>
-          </p:cNvPr>
-          <p:cNvPicPr>
-            <a:picLocks noChangeAspect="1"/>
-          </p:cNvPicPr>
-          <p:nvPr/>
-        </p:nvPicPr>
-        <p:blipFill>
-          <a:blip r:embed="rId6"/>
-          <a:stretch>
-            <a:fillRect/>
-          </a:stretch>
-        </p:blipFill>
-        <p:spPr>
-          <a:xfrm>
-            <a:off x="7409249" y="3357813"/>
-            <a:ext cx="2831058" cy="1783344"/>
           </a:xfrm>
           <a:prstGeom prst="round2DiagRect">
             <a:avLst>
@@ -13919,7 +13902,7 @@
           <a:p>
             <a:pPr marL="0" indent="0" algn="ctr"/>
             <a:r>
-              <a:rPr lang="de-CH" sz="3969">
+              <a:rPr lang="de-CH" sz="3969" dirty="0">
                 <a:solidFill>
                   <a:schemeClr val="accent1"/>
                 </a:solidFill>
@@ -13933,7 +13916,7 @@
           <a:p>
             <a:pPr marL="0" indent="0" algn="ctr"/>
             <a:r>
-              <a:rPr lang="de-CH" sz="3969">
+              <a:rPr lang="de-CH" sz="3969" dirty="0">
                 <a:solidFill>
                   <a:schemeClr val="accent1"/>
                 </a:solidFill>
@@ -13947,7 +13930,7 @@
           <a:p>
             <a:pPr marL="0" indent="0" algn="ctr"/>
             <a:r>
-              <a:rPr lang="de-CH" sz="3969">
+              <a:rPr lang="de-CH" sz="3969" dirty="0">
                 <a:solidFill>
                   <a:schemeClr val="accent1"/>
                 </a:solidFill>
@@ -14111,7 +14094,7 @@
           <p:nvPr>
             <p:extLst>
               <p:ext uri="{D42A27DB-BD31-4B8C-83A1-F6EECF244321}">
-                <p14:modId xmlns:p14="http://schemas.microsoft.com/office/powerpoint/2010/main" val="1868935891"/>
+                <p14:modId xmlns:p14="http://schemas.microsoft.com/office/powerpoint/2010/main" val="885304686"/>
               </p:ext>
             </p:extLst>
           </p:nvPr>
@@ -14261,10 +14244,9 @@
               <a:buSzPts val="2000"/>
             </a:pPr>
             <a:r>
-              <a:rPr lang="de-CH" sz="1400"/>
+              <a:rPr lang="de-CH" sz="1400" dirty="0"/>
               <a:t>Präsentation von C. Müller</a:t>
             </a:r>
-            <a:endParaRPr lang="de-CH" sz="1400" dirty="0"/>
           </a:p>
         </p:txBody>
       </p:sp>
@@ -15101,13 +15083,151 @@
               <a:buSzPts val="2000"/>
             </a:pPr>
             <a:r>
-              <a:rPr lang="de-CH" sz="1400"/>
+              <a:rPr lang="de-CH" sz="1400" dirty="0"/>
               <a:t>Präsentation von C. Müller</a:t>
             </a:r>
-            <a:endParaRPr lang="de-CH" sz="1400" dirty="0"/>
           </a:p>
         </p:txBody>
       </p:sp>
+      <p:pic>
+        <p:nvPicPr>
+          <p:cNvPr id="8" name="Picture 2" descr="sprinter">
+            <a:extLst>
+              <a:ext uri="{FF2B5EF4-FFF2-40B4-BE49-F238E27FC236}">
+                <a16:creationId xmlns:a16="http://schemas.microsoft.com/office/drawing/2014/main" id="{CEB6B58C-75EE-E695-DCD5-FF99A2638EDD}"/>
+              </a:ext>
+            </a:extLst>
+          </p:cNvPr>
+          <p:cNvPicPr>
+            <a:picLocks noChangeAspect="1" noChangeArrowheads="1"/>
+          </p:cNvPicPr>
+          <p:nvPr/>
+        </p:nvPicPr>
+        <p:blipFill>
+          <a:blip r:embed="rId5">
+            <a:extLst>
+              <a:ext uri="{28A0092B-C50C-407E-A947-70E740481C1C}">
+                <a14:useLocalDpi xmlns:a14="http://schemas.microsoft.com/office/drawing/2010/main" val="0"/>
+              </a:ext>
+            </a:extLst>
+          </a:blip>
+          <a:srcRect/>
+          <a:stretch>
+            <a:fillRect/>
+          </a:stretch>
+        </p:blipFill>
+        <p:spPr bwMode="auto">
+          <a:xfrm>
+            <a:off x="2537845" y="5663691"/>
+            <a:ext cx="1832116" cy="1412262"/>
+          </a:xfrm>
+          <a:prstGeom prst="rect">
+            <a:avLst/>
+          </a:prstGeom>
+          <a:noFill/>
+          <a:extLst>
+            <a:ext uri="{909E8E84-426E-40DD-AFC4-6F175D3DCCD1}">
+              <a14:hiddenFill xmlns:a14="http://schemas.microsoft.com/office/drawing/2010/main">
+                <a:solidFill>
+                  <a:srgbClr val="FFFFFF"/>
+                </a:solidFill>
+              </a14:hiddenFill>
+            </a:ext>
+          </a:extLst>
+        </p:spPr>
+      </p:pic>
+      <p:pic>
+        <p:nvPicPr>
+          <p:cNvPr id="9" name="Grafik 8">
+            <a:extLst>
+              <a:ext uri="{FF2B5EF4-FFF2-40B4-BE49-F238E27FC236}">
+                <a16:creationId xmlns:a16="http://schemas.microsoft.com/office/drawing/2014/main" id="{4E2435C0-06C4-E247-CBB7-BCFE1324C17C}"/>
+              </a:ext>
+            </a:extLst>
+          </p:cNvPr>
+          <p:cNvPicPr>
+            <a:picLocks noChangeAspect="1"/>
+          </p:cNvPicPr>
+          <p:nvPr/>
+        </p:nvPicPr>
+        <p:blipFill>
+          <a:blip r:embed="rId6"/>
+          <a:stretch>
+            <a:fillRect/>
+          </a:stretch>
+        </p:blipFill>
+        <p:spPr>
+          <a:xfrm>
+            <a:off x="1633116" y="5568099"/>
+            <a:ext cx="636008" cy="1448686"/>
+          </a:xfrm>
+          <a:prstGeom prst="round2DiagRect">
+            <a:avLst>
+              <a:gd name="adj1" fmla="val 16667"/>
+              <a:gd name="adj2" fmla="val 0"/>
+            </a:avLst>
+          </a:prstGeom>
+          <a:ln w="88900" cap="sq">
+            <a:solidFill>
+              <a:srgbClr val="FFFFFF"/>
+            </a:solidFill>
+            <a:miter lim="800000"/>
+          </a:ln>
+          <a:effectLst>
+            <a:outerShdw blurRad="254000" algn="tl" rotWithShape="0">
+              <a:srgbClr val="000000">
+                <a:alpha val="43000"/>
+              </a:srgbClr>
+            </a:outerShdw>
+          </a:effectLst>
+        </p:spPr>
+      </p:pic>
+      <p:pic>
+        <p:nvPicPr>
+          <p:cNvPr id="12" name="Grafik 11">
+            <a:extLst>
+              <a:ext uri="{FF2B5EF4-FFF2-40B4-BE49-F238E27FC236}">
+                <a16:creationId xmlns:a16="http://schemas.microsoft.com/office/drawing/2014/main" id="{78B9A693-234E-05A0-6D44-ECB82486F165}"/>
+              </a:ext>
+            </a:extLst>
+          </p:cNvPr>
+          <p:cNvPicPr>
+            <a:picLocks noChangeAspect="1"/>
+          </p:cNvPicPr>
+          <p:nvPr/>
+        </p:nvPicPr>
+        <p:blipFill>
+          <a:blip r:embed="rId7"/>
+          <a:stretch>
+            <a:fillRect/>
+          </a:stretch>
+        </p:blipFill>
+        <p:spPr>
+          <a:xfrm>
+            <a:off x="4870173" y="5578008"/>
+            <a:ext cx="2268329" cy="1428869"/>
+          </a:xfrm>
+          <a:prstGeom prst="round2DiagRect">
+            <a:avLst>
+              <a:gd name="adj1" fmla="val 16667"/>
+              <a:gd name="adj2" fmla="val 0"/>
+            </a:avLst>
+          </a:prstGeom>
+          <a:ln w="88900" cap="sq">
+            <a:solidFill>
+              <a:srgbClr val="FFFFFF"/>
+            </a:solidFill>
+            <a:miter lim="800000"/>
+          </a:ln>
+          <a:effectLst>
+            <a:outerShdw blurRad="254000" algn="tl" rotWithShape="0">
+              <a:srgbClr val="000000">
+                <a:alpha val="43000"/>
+              </a:srgbClr>
+            </a:outerShdw>
+          </a:effectLst>
+        </p:spPr>
+      </p:pic>
     </p:spTree>
     <p:extLst>
       <p:ext uri="{BB962C8B-B14F-4D97-AF65-F5344CB8AC3E}">
@@ -15541,9 +15661,429 @@
               </a:rPr>
               <a:t>-Situation</a:t>
             </a:r>
-          </a:p>
-          <a:p>
-            <a:pPr indent="-457200" defTabSz="457200">
+            <a:endParaRPr lang="en-US" sz="900" dirty="0"/>
+          </a:p>
+          <a:p>
+            <a:pPr marL="971550" lvl="1" indent="-514350">
+              <a:buClr>
+                <a:schemeClr val="tx1"/>
+              </a:buClr>
+              <a:buSzPts val="2800"/>
+              <a:buFont typeface="Arial"/>
+              <a:buChar char="•"/>
+            </a:pPr>
+            <a:r>
+              <a:rPr lang="en-US" sz="2200" dirty="0" err="1">
+                <a:solidFill>
+                  <a:schemeClr val="tx1"/>
+                </a:solidFill>
+              </a:rPr>
+              <a:t>Punktrichter</a:t>
+            </a:r>
+            <a:r>
+              <a:rPr lang="en-US" sz="2200" dirty="0">
+                <a:solidFill>
+                  <a:schemeClr val="tx1"/>
+                </a:solidFill>
+              </a:rPr>
+              <a:t> </a:t>
+            </a:r>
+            <a:r>
+              <a:rPr lang="en-US" sz="2200" dirty="0" err="1">
+                <a:solidFill>
+                  <a:schemeClr val="tx1"/>
+                </a:solidFill>
+              </a:rPr>
+              <a:t>erfassen</a:t>
+            </a:r>
+            <a:r>
+              <a:rPr lang="en-US" sz="2200" dirty="0">
+                <a:solidFill>
+                  <a:schemeClr val="tx1"/>
+                </a:solidFill>
+              </a:rPr>
+              <a:t> </a:t>
+            </a:r>
+            <a:r>
+              <a:rPr lang="en-US" sz="2200" dirty="0" err="1">
+                <a:solidFill>
+                  <a:schemeClr val="tx1"/>
+                </a:solidFill>
+              </a:rPr>
+              <a:t>Resultate</a:t>
+            </a:r>
+            <a:r>
+              <a:rPr lang="en-US" sz="2200" dirty="0">
+                <a:solidFill>
+                  <a:schemeClr val="tx1"/>
+                </a:solidFill>
+              </a:rPr>
+              <a:t> </a:t>
+            </a:r>
+            <a:r>
+              <a:rPr lang="en-US" sz="2200" dirty="0" err="1">
+                <a:solidFill>
+                  <a:schemeClr val="tx1"/>
+                </a:solidFill>
+              </a:rPr>
+              <a:t>schriftlich</a:t>
+            </a:r>
+            <a:r>
+              <a:rPr lang="en-US" sz="2200" dirty="0">
+                <a:solidFill>
+                  <a:schemeClr val="tx1"/>
+                </a:solidFill>
+              </a:rPr>
+              <a:t> (von Hand).</a:t>
+            </a:r>
+          </a:p>
+          <a:p>
+            <a:pPr marL="457200" lvl="1" indent="0">
+              <a:buClr>
+                <a:schemeClr val="tx1"/>
+              </a:buClr>
+              <a:buSzPts val="2800"/>
+              <a:buNone/>
+            </a:pPr>
+            <a:r>
+              <a:rPr lang="en-US" sz="2200" dirty="0">
+                <a:solidFill>
+                  <a:schemeClr val="tx1"/>
+                </a:solidFill>
+              </a:rPr>
+              <a:t>		-&gt; Problem 1: </a:t>
+            </a:r>
+            <a:r>
+              <a:rPr lang="en-US" sz="2200" dirty="0" err="1">
+                <a:solidFill>
+                  <a:schemeClr val="tx1"/>
+                </a:solidFill>
+              </a:rPr>
+              <a:t>Resultate</a:t>
+            </a:r>
+            <a:r>
+              <a:rPr lang="en-US" sz="2200" dirty="0">
+                <a:solidFill>
+                  <a:schemeClr val="tx1"/>
+                </a:solidFill>
+              </a:rPr>
+              <a:t> </a:t>
+            </a:r>
+            <a:r>
+              <a:rPr lang="en-US" sz="2200" dirty="0" err="1">
+                <a:solidFill>
+                  <a:schemeClr val="tx1"/>
+                </a:solidFill>
+              </a:rPr>
+              <a:t>sind</a:t>
+            </a:r>
+            <a:r>
+              <a:rPr lang="en-US" sz="2200" dirty="0">
+                <a:solidFill>
+                  <a:schemeClr val="tx1"/>
+                </a:solidFill>
+              </a:rPr>
+              <a:t> </a:t>
+            </a:r>
+            <a:r>
+              <a:rPr lang="en-US" sz="2200" dirty="0" err="1">
+                <a:solidFill>
+                  <a:schemeClr val="tx1"/>
+                </a:solidFill>
+              </a:rPr>
+              <a:t>nicht</a:t>
+            </a:r>
+            <a:r>
+              <a:rPr lang="en-US" sz="2200" dirty="0">
+                <a:solidFill>
+                  <a:schemeClr val="tx1"/>
+                </a:solidFill>
+              </a:rPr>
+              <a:t> </a:t>
+            </a:r>
+            <a:r>
+              <a:rPr lang="en-US" sz="2200" dirty="0" err="1">
+                <a:solidFill>
+                  <a:schemeClr val="tx1"/>
+                </a:solidFill>
+              </a:rPr>
+              <a:t>immer</a:t>
+            </a:r>
+            <a:r>
+              <a:rPr lang="en-US" sz="2200" dirty="0">
+                <a:solidFill>
+                  <a:schemeClr val="tx1"/>
+                </a:solidFill>
+              </a:rPr>
+              <a:t> </a:t>
+            </a:r>
+            <a:r>
+              <a:rPr lang="en-US" sz="2200" dirty="0" err="1">
+                <a:solidFill>
+                  <a:schemeClr val="tx1"/>
+                </a:solidFill>
+              </a:rPr>
+              <a:t>lesbar</a:t>
+            </a:r>
+            <a:endParaRPr lang="en-US" sz="2200" dirty="0">
+              <a:solidFill>
+                <a:schemeClr val="tx1"/>
+              </a:solidFill>
+            </a:endParaRPr>
+          </a:p>
+          <a:p>
+            <a:pPr marL="457200" lvl="1" indent="0">
+              <a:lnSpc>
+                <a:spcPct val="150000"/>
+              </a:lnSpc>
+              <a:buClr>
+                <a:schemeClr val="tx1"/>
+              </a:buClr>
+              <a:buSzPts val="2800"/>
+              <a:buNone/>
+            </a:pPr>
+            <a:endParaRPr lang="en-US" sz="2200" dirty="0">
+              <a:solidFill>
+                <a:schemeClr val="tx1"/>
+              </a:solidFill>
+            </a:endParaRPr>
+          </a:p>
+          <a:p>
+            <a:pPr marL="914400" lvl="2" indent="0">
+              <a:buClr>
+                <a:schemeClr val="tx1"/>
+              </a:buClr>
+              <a:buSzPts val="2800"/>
+              <a:buNone/>
+            </a:pPr>
+            <a:endParaRPr lang="en-US" sz="2200" dirty="0">
+              <a:solidFill>
+                <a:schemeClr val="tx1"/>
+              </a:solidFill>
+            </a:endParaRPr>
+          </a:p>
+          <a:p>
+            <a:pPr marL="914400" lvl="2" indent="0">
+              <a:buClr>
+                <a:schemeClr val="tx1"/>
+              </a:buClr>
+              <a:buSzPts val="2800"/>
+              <a:buNone/>
+            </a:pPr>
+            <a:endParaRPr lang="en-US" sz="2200" dirty="0">
+              <a:solidFill>
+                <a:schemeClr val="tx1"/>
+              </a:solidFill>
+            </a:endParaRPr>
+          </a:p>
+          <a:p>
+            <a:pPr marL="971550" lvl="1" indent="-514350">
+              <a:buClr>
+                <a:schemeClr val="tx1"/>
+              </a:buClr>
+              <a:buSzPts val="2800"/>
+              <a:buFont typeface="Arial"/>
+              <a:buChar char="•"/>
+            </a:pPr>
+            <a:r>
+              <a:rPr lang="en-US" sz="2200" dirty="0">
+                <a:solidFill>
+                  <a:schemeClr val="tx1"/>
+                </a:solidFill>
+              </a:rPr>
+              <a:t>Alle </a:t>
+            </a:r>
+            <a:r>
+              <a:rPr lang="en-US" sz="2200" dirty="0" err="1">
+                <a:solidFill>
+                  <a:schemeClr val="tx1"/>
+                </a:solidFill>
+              </a:rPr>
+              <a:t>erfassten</a:t>
+            </a:r>
+            <a:r>
+              <a:rPr lang="en-US" sz="2200" dirty="0">
+                <a:solidFill>
+                  <a:schemeClr val="tx1"/>
+                </a:solidFill>
+              </a:rPr>
+              <a:t> </a:t>
+            </a:r>
+            <a:r>
+              <a:rPr lang="en-US" sz="2200" dirty="0" err="1">
+                <a:solidFill>
+                  <a:schemeClr val="tx1"/>
+                </a:solidFill>
+              </a:rPr>
+              <a:t>Resultate</a:t>
+            </a:r>
+            <a:r>
+              <a:rPr lang="en-US" sz="2200" dirty="0">
+                <a:solidFill>
+                  <a:schemeClr val="tx1"/>
+                </a:solidFill>
+              </a:rPr>
+              <a:t> </a:t>
+            </a:r>
+            <a:r>
+              <a:rPr lang="en-US" sz="2200" dirty="0" err="1">
+                <a:solidFill>
+                  <a:schemeClr val="tx1"/>
+                </a:solidFill>
+              </a:rPr>
+              <a:t>werden</a:t>
+            </a:r>
+            <a:r>
+              <a:rPr lang="en-US" sz="2200" dirty="0">
+                <a:solidFill>
+                  <a:schemeClr val="tx1"/>
+                </a:solidFill>
+              </a:rPr>
+              <a:t> in </a:t>
+            </a:r>
+            <a:r>
+              <a:rPr lang="en-US" sz="2200" dirty="0" err="1">
+                <a:solidFill>
+                  <a:schemeClr val="tx1"/>
+                </a:solidFill>
+              </a:rPr>
+              <a:t>eine</a:t>
+            </a:r>
+            <a:r>
+              <a:rPr lang="en-US" sz="2200" dirty="0">
+                <a:solidFill>
+                  <a:schemeClr val="tx1"/>
+                </a:solidFill>
+              </a:rPr>
+              <a:t> Excel-</a:t>
+            </a:r>
+            <a:r>
+              <a:rPr lang="en-US" sz="2200" dirty="0" err="1">
+                <a:solidFill>
+                  <a:schemeClr val="tx1"/>
+                </a:solidFill>
+              </a:rPr>
+              <a:t>Tabelle</a:t>
+            </a:r>
+            <a:r>
+              <a:rPr lang="en-US" sz="2200" dirty="0">
+                <a:solidFill>
+                  <a:schemeClr val="tx1"/>
+                </a:solidFill>
+              </a:rPr>
+              <a:t> </a:t>
+            </a:r>
+            <a:r>
+              <a:rPr lang="en-US" sz="2200" dirty="0" err="1">
+                <a:solidFill>
+                  <a:schemeClr val="tx1"/>
+                </a:solidFill>
+              </a:rPr>
+              <a:t>übertragen</a:t>
+            </a:r>
+            <a:r>
+              <a:rPr lang="en-US" sz="2200" dirty="0">
+                <a:solidFill>
+                  <a:schemeClr val="tx1"/>
+                </a:solidFill>
+              </a:rPr>
+              <a:t>.</a:t>
+            </a:r>
+            <a:br>
+              <a:rPr lang="en-US" sz="2200" dirty="0">
+                <a:solidFill>
+                  <a:schemeClr val="tx1"/>
+                </a:solidFill>
+              </a:rPr>
+            </a:br>
+            <a:r>
+              <a:rPr lang="en-US" sz="2200" dirty="0">
+                <a:solidFill>
+                  <a:schemeClr val="tx1"/>
+                </a:solidFill>
+              </a:rPr>
+              <a:t>	-&gt; Problem 2: </a:t>
+            </a:r>
+            <a:r>
+              <a:rPr lang="en-US" sz="2200" dirty="0" err="1">
+                <a:solidFill>
+                  <a:schemeClr val="tx1"/>
+                </a:solidFill>
+              </a:rPr>
+              <a:t>Resultate</a:t>
+            </a:r>
+            <a:r>
+              <a:rPr lang="en-US" sz="2200" dirty="0">
+                <a:solidFill>
+                  <a:schemeClr val="tx1"/>
+                </a:solidFill>
+              </a:rPr>
+              <a:t> </a:t>
+            </a:r>
+            <a:r>
+              <a:rPr lang="en-US" sz="2200" dirty="0" err="1">
+                <a:solidFill>
+                  <a:schemeClr val="tx1"/>
+                </a:solidFill>
+              </a:rPr>
+              <a:t>werden</a:t>
+            </a:r>
+            <a:r>
+              <a:rPr lang="en-US" sz="2200" dirty="0">
+                <a:solidFill>
+                  <a:schemeClr val="tx1"/>
+                </a:solidFill>
+              </a:rPr>
+              <a:t> </a:t>
+            </a:r>
+            <a:r>
+              <a:rPr lang="en-US" sz="2200" dirty="0" err="1">
+                <a:solidFill>
+                  <a:schemeClr val="tx1"/>
+                </a:solidFill>
+              </a:rPr>
+              <a:t>teilweise</a:t>
+            </a:r>
+            <a:r>
+              <a:rPr lang="en-US" sz="2200" dirty="0">
+                <a:solidFill>
+                  <a:schemeClr val="tx1"/>
+                </a:solidFill>
+              </a:rPr>
+              <a:t> </a:t>
+            </a:r>
+            <a:r>
+              <a:rPr lang="en-US" sz="2200" dirty="0" err="1">
+                <a:solidFill>
+                  <a:schemeClr val="tx1"/>
+                </a:solidFill>
+              </a:rPr>
+              <a:t>falsch</a:t>
+            </a:r>
+            <a:r>
+              <a:rPr lang="en-US" sz="2200" dirty="0">
+                <a:solidFill>
+                  <a:schemeClr val="tx1"/>
+                </a:solidFill>
+              </a:rPr>
+              <a:t> </a:t>
+            </a:r>
+            <a:r>
+              <a:rPr lang="en-US" sz="2200" dirty="0" err="1">
+                <a:solidFill>
+                  <a:schemeClr val="tx1"/>
+                </a:solidFill>
+              </a:rPr>
+              <a:t>übertragen</a:t>
+            </a:r>
+            <a:endParaRPr lang="en-US" sz="2200" dirty="0">
+              <a:solidFill>
+                <a:schemeClr val="tx1"/>
+              </a:solidFill>
+            </a:endParaRPr>
+          </a:p>
+          <a:p>
+            <a:pPr marL="457200" lvl="1" indent="0" defTabSz="457200">
               <a:lnSpc>
                 <a:spcPct val="90000"/>
               </a:lnSpc>
@@ -15558,6 +16098,40 @@
               <a:buChar char="•"/>
             </a:pPr>
             <a:endParaRPr lang="en-US" sz="900" dirty="0"/>
+          </a:p>
+          <a:p>
+            <a:pPr marL="457200" lvl="1" indent="0">
+              <a:lnSpc>
+                <a:spcPct val="150000"/>
+              </a:lnSpc>
+              <a:buClr>
+                <a:schemeClr val="tx1"/>
+              </a:buClr>
+              <a:buSzPts val="2800"/>
+              <a:buNone/>
+            </a:pPr>
+            <a:endParaRPr lang="en-US" sz="2200" dirty="0">
+              <a:solidFill>
+                <a:schemeClr val="tx1"/>
+              </a:solidFill>
+            </a:endParaRPr>
+          </a:p>
+          <a:p>
+            <a:pPr marL="457200" lvl="1" indent="0">
+              <a:lnSpc>
+                <a:spcPct val="150000"/>
+              </a:lnSpc>
+              <a:buClr>
+                <a:schemeClr val="tx1"/>
+              </a:buClr>
+              <a:buSzPts val="2800"/>
+              <a:buNone/>
+            </a:pPr>
+            <a:endParaRPr lang="en-US" sz="1050" dirty="0">
+              <a:solidFill>
+                <a:schemeClr val="tx1"/>
+              </a:solidFill>
+            </a:endParaRPr>
           </a:p>
           <a:p>
             <a:pPr marL="971550" lvl="1" indent="-514350">
@@ -15577,7 +16151,55 @@
                   <a:schemeClr val="tx1"/>
                 </a:solidFill>
               </a:rPr>
-              <a:t>Punktrichter</a:t>
+              <a:t>Auswertung</a:t>
+            </a:r>
+            <a:r>
+              <a:rPr lang="en-US" sz="2200" dirty="0">
+                <a:solidFill>
+                  <a:schemeClr val="tx1"/>
+                </a:solidFill>
+              </a:rPr>
+              <a:t> der </a:t>
+            </a:r>
+            <a:r>
+              <a:rPr lang="en-US" sz="2200" dirty="0" err="1">
+                <a:solidFill>
+                  <a:schemeClr val="tx1"/>
+                </a:solidFill>
+              </a:rPr>
+              <a:t>Punkte</a:t>
+            </a:r>
+            <a:r>
+              <a:rPr lang="en-US" sz="2200" dirty="0">
+                <a:solidFill>
+                  <a:schemeClr val="tx1"/>
+                </a:solidFill>
+              </a:rPr>
+              <a:t> (</a:t>
+            </a:r>
+            <a:r>
+              <a:rPr lang="en-US" sz="2200" dirty="0" err="1">
+                <a:solidFill>
+                  <a:schemeClr val="tx1"/>
+                </a:solidFill>
+              </a:rPr>
+              <a:t>inkl</a:t>
+            </a:r>
+            <a:r>
+              <a:rPr lang="en-US" sz="2200" dirty="0">
+                <a:solidFill>
+                  <a:schemeClr val="tx1"/>
+                </a:solidFill>
+              </a:rPr>
+              <a:t>. </a:t>
+            </a:r>
+            <a:r>
+              <a:rPr lang="en-US" sz="2200" dirty="0" err="1">
+                <a:solidFill>
+                  <a:schemeClr val="tx1"/>
+                </a:solidFill>
+              </a:rPr>
+              <a:t>Bonuspunkte</a:t>
             </a:r>
             <a:r>
               <a:rPr lang="en-US" sz="2200" dirty="0">
@@ -15593,7 +16215,23 @@
                   <a:schemeClr val="tx1"/>
                 </a:solidFill>
               </a:rPr>
-              <a:t>erfassen</a:t>
+              <a:t>nach</a:t>
+            </a:r>
+            <a:r>
+              <a:rPr lang="en-US" sz="2200" dirty="0">
+                <a:solidFill>
+                  <a:schemeClr val="tx1"/>
+                </a:solidFill>
+              </a:rPr>
+              <a:t> Alter) </a:t>
+            </a:r>
+            <a:r>
+              <a:rPr lang="en-US" sz="2200" dirty="0" err="1">
+                <a:solidFill>
+                  <a:schemeClr val="tx1"/>
+                </a:solidFill>
+              </a:rPr>
+              <a:t>geschieht</a:t>
             </a:r>
             <a:r>
               <a:rPr lang="en-US" sz="2200" dirty="0">
@@ -15609,7 +16247,7 @@
                   <a:schemeClr val="tx1"/>
                 </a:solidFill>
               </a:rPr>
-              <a:t>Resultate</a:t>
+              <a:t>manuell</a:t>
             </a:r>
             <a:r>
               <a:rPr lang="en-US" sz="2200" dirty="0">
@@ -15617,36 +16255,16 @@
                   <a:schemeClr val="tx1"/>
                 </a:solidFill>
               </a:rPr>
-              <a:t> </a:t>
-            </a:r>
-            <a:r>
-              <a:rPr lang="en-US" sz="2200" dirty="0" err="1">
-                <a:solidFill>
-                  <a:schemeClr val="tx1"/>
-                </a:solidFill>
-              </a:rPr>
-              <a:t>schriftlich</a:t>
-            </a:r>
-            <a:r>
-              <a:rPr lang="en-US" sz="2200" dirty="0">
-                <a:solidFill>
-                  <a:schemeClr val="tx1"/>
-                </a:solidFill>
-              </a:rPr>
-              <a:t> (von Hand).</a:t>
-            </a:r>
-          </a:p>
-          <a:p>
-            <a:pPr marL="971550" lvl="1" indent="-514350">
-              <a:lnSpc>
-                <a:spcPct val="150000"/>
-              </a:lnSpc>
+              <a:t>.</a:t>
+            </a:r>
+          </a:p>
+          <a:p>
+            <a:pPr lvl="1" indent="0">
               <a:buClr>
                 <a:schemeClr val="tx1"/>
               </a:buClr>
               <a:buSzPts val="2800"/>
-              <a:buFont typeface="Arial"/>
-              <a:buChar char="•"/>
+              <a:buNone/>
             </a:pPr>
             <a:r>
               <a:rPr lang="en-US" sz="2200" dirty="0">
@@ -15654,7 +16272,7 @@
                   <a:schemeClr val="tx1"/>
                 </a:solidFill>
               </a:rPr>
-              <a:t>Alle </a:t>
+              <a:t>	-&gt; </a:t>
             </a:r>
             <a:r>
               <a:rPr lang="en-US" sz="2200" dirty="0" err="1">
@@ -15662,7 +16280,7 @@
                   <a:schemeClr val="tx1"/>
                 </a:solidFill>
               </a:rPr>
-              <a:t>erfassten</a:t>
+              <a:t>Rechnungsfehler</a:t>
             </a:r>
             <a:r>
               <a:rPr lang="en-US" sz="2200" dirty="0">
@@ -15678,7 +16296,7 @@
                   <a:schemeClr val="tx1"/>
                 </a:solidFill>
               </a:rPr>
-              <a:t>Resultate</a:t>
+              <a:t>können</a:t>
             </a:r>
             <a:r>
               <a:rPr lang="en-US" sz="2200" dirty="0">
@@ -15694,55 +16312,7 @@
                   <a:schemeClr val="tx1"/>
                 </a:solidFill>
               </a:rPr>
-              <a:t>werden</a:t>
-            </a:r>
-            <a:r>
-              <a:rPr lang="en-US" sz="2200" dirty="0">
-                <a:solidFill>
-                  <a:schemeClr val="tx1"/>
-                </a:solidFill>
-              </a:rPr>
-              <a:t> in </a:t>
-            </a:r>
-            <a:r>
-              <a:rPr lang="en-US" sz="2200" dirty="0" err="1">
-                <a:solidFill>
-                  <a:schemeClr val="tx1"/>
-                </a:solidFill>
-              </a:rPr>
-              <a:t>eine</a:t>
-            </a:r>
-            <a:r>
-              <a:rPr lang="en-US" sz="2200" dirty="0">
-                <a:solidFill>
-                  <a:schemeClr val="tx1"/>
-                </a:solidFill>
-              </a:rPr>
-              <a:t> Excel-</a:t>
-            </a:r>
-            <a:r>
-              <a:rPr lang="en-US" sz="2200" dirty="0" err="1">
-                <a:solidFill>
-                  <a:schemeClr val="tx1"/>
-                </a:solidFill>
-              </a:rPr>
-              <a:t>Tabelle</a:t>
-            </a:r>
-            <a:r>
-              <a:rPr lang="en-US" sz="2200" dirty="0">
-                <a:solidFill>
-                  <a:schemeClr val="tx1"/>
-                </a:solidFill>
-              </a:rPr>
-              <a:t> </a:t>
-            </a:r>
-            <a:r>
-              <a:rPr lang="en-US" sz="2200" dirty="0" err="1">
-                <a:solidFill>
-                  <a:schemeClr val="tx1"/>
-                </a:solidFill>
-              </a:rPr>
-              <a:t>übertragen</a:t>
+              <a:t>auftreten</a:t>
             </a:r>
             <a:r>
               <a:rPr lang="en-US" sz="2200" dirty="0">
@@ -15754,10 +16324,7 @@
             </a:r>
           </a:p>
           <a:p>
-            <a:pPr marL="457200" lvl="1" indent="0">
-              <a:lnSpc>
-                <a:spcPct val="150000"/>
-              </a:lnSpc>
+            <a:pPr lvl="1" indent="0">
               <a:buClr>
                 <a:schemeClr val="tx1"/>
               </a:buClr>
@@ -15770,7 +16337,55 @@
                   <a:schemeClr val="tx1"/>
                 </a:solidFill>
               </a:rPr>
-              <a:t>		-&gt; Problem 1: </a:t>
+              <a:t>	-&gt; </a:t>
+            </a:r>
+            <a:r>
+              <a:rPr lang="en-US" sz="2200" dirty="0" err="1">
+                <a:solidFill>
+                  <a:schemeClr val="tx1"/>
+                </a:solidFill>
+              </a:rPr>
+              <a:t>Dauert</a:t>
+            </a:r>
+            <a:r>
+              <a:rPr lang="en-US" sz="2200" dirty="0">
+                <a:solidFill>
+                  <a:schemeClr val="tx1"/>
+                </a:solidFill>
+              </a:rPr>
+              <a:t> </a:t>
+            </a:r>
+            <a:r>
+              <a:rPr lang="en-US" sz="2200" dirty="0" err="1">
+                <a:solidFill>
+                  <a:schemeClr val="tx1"/>
+                </a:solidFill>
+              </a:rPr>
+              <a:t>relativ</a:t>
+            </a:r>
+            <a:r>
+              <a:rPr lang="en-US" sz="2200" dirty="0">
+                <a:solidFill>
+                  <a:schemeClr val="tx1"/>
+                </a:solidFill>
+              </a:rPr>
+              <a:t> </a:t>
+            </a:r>
+            <a:r>
+              <a:rPr lang="en-US" sz="2200" dirty="0" err="1">
+                <a:solidFill>
+                  <a:schemeClr val="tx1"/>
+                </a:solidFill>
+              </a:rPr>
+              <a:t>lange</a:t>
+            </a:r>
+            <a:r>
+              <a:rPr lang="en-US" sz="2200" dirty="0">
+                <a:solidFill>
+                  <a:schemeClr val="tx1"/>
+                </a:solidFill>
+              </a:rPr>
+              <a:t> bis die </a:t>
             </a:r>
             <a:r>
               <a:rPr lang="en-US" sz="2200" dirty="0" err="1">
@@ -15786,452 +16401,10 @@
                   <a:schemeClr val="tx1"/>
                 </a:solidFill>
               </a:rPr>
-              <a:t> </a:t>
-            </a:r>
-            <a:r>
-              <a:rPr lang="en-US" sz="2200" dirty="0" err="1">
-                <a:solidFill>
-                  <a:schemeClr val="tx1"/>
-                </a:solidFill>
-              </a:rPr>
-              <a:t>sind</a:t>
-            </a:r>
-            <a:r>
-              <a:rPr lang="en-US" sz="2200" dirty="0">
-                <a:solidFill>
-                  <a:schemeClr val="tx1"/>
-                </a:solidFill>
-              </a:rPr>
-              <a:t> </a:t>
-            </a:r>
-            <a:r>
-              <a:rPr lang="en-US" sz="2200" dirty="0" err="1">
-                <a:solidFill>
-                  <a:schemeClr val="tx1"/>
-                </a:solidFill>
-              </a:rPr>
-              <a:t>nicht</a:t>
-            </a:r>
-            <a:r>
-              <a:rPr lang="en-US" sz="2200" dirty="0">
-                <a:solidFill>
-                  <a:schemeClr val="tx1"/>
-                </a:solidFill>
-              </a:rPr>
-              <a:t> </a:t>
-            </a:r>
-            <a:r>
-              <a:rPr lang="en-US" sz="2200" dirty="0" err="1">
-                <a:solidFill>
-                  <a:schemeClr val="tx1"/>
-                </a:solidFill>
-              </a:rPr>
-              <a:t>immer</a:t>
-            </a:r>
-            <a:r>
-              <a:rPr lang="en-US" sz="2200" dirty="0">
-                <a:solidFill>
-                  <a:schemeClr val="tx1"/>
-                </a:solidFill>
-              </a:rPr>
-              <a:t> </a:t>
-            </a:r>
-            <a:r>
-              <a:rPr lang="en-US" sz="2200" dirty="0" err="1">
-                <a:solidFill>
-                  <a:schemeClr val="tx1"/>
-                </a:solidFill>
-              </a:rPr>
-              <a:t>lesbar</a:t>
-            </a:r>
-            <a:br>
-              <a:rPr lang="en-US" sz="2200" dirty="0">
-                <a:solidFill>
-                  <a:schemeClr val="tx1"/>
-                </a:solidFill>
-              </a:rPr>
-            </a:br>
-            <a:r>
-              <a:rPr lang="en-US" sz="2200" dirty="0">
-                <a:solidFill>
-                  <a:schemeClr val="tx1"/>
-                </a:solidFill>
-              </a:rPr>
-              <a:t>		-&gt; Problem 2: </a:t>
-            </a:r>
-            <a:r>
-              <a:rPr lang="en-US" sz="2200" dirty="0" err="1">
-                <a:solidFill>
-                  <a:schemeClr val="tx1"/>
-                </a:solidFill>
-              </a:rPr>
-              <a:t>Resultate</a:t>
-            </a:r>
-            <a:r>
-              <a:rPr lang="en-US" sz="2200" dirty="0">
-                <a:solidFill>
-                  <a:schemeClr val="tx1"/>
-                </a:solidFill>
-              </a:rPr>
-              <a:t> </a:t>
-            </a:r>
-            <a:r>
-              <a:rPr lang="en-US" sz="2200" dirty="0" err="1">
-                <a:solidFill>
-                  <a:schemeClr val="tx1"/>
-                </a:solidFill>
-              </a:rPr>
-              <a:t>werden</a:t>
-            </a:r>
-            <a:r>
-              <a:rPr lang="en-US" sz="2200" dirty="0">
-                <a:solidFill>
-                  <a:schemeClr val="tx1"/>
-                </a:solidFill>
-              </a:rPr>
-              <a:t> </a:t>
-            </a:r>
-            <a:r>
-              <a:rPr lang="en-US" sz="2200" dirty="0" err="1">
-                <a:solidFill>
-                  <a:schemeClr val="tx1"/>
-                </a:solidFill>
-              </a:rPr>
-              <a:t>teilweise</a:t>
-            </a:r>
-            <a:r>
-              <a:rPr lang="en-US" sz="2200" dirty="0">
-                <a:solidFill>
-                  <a:schemeClr val="tx1"/>
-                </a:solidFill>
-              </a:rPr>
-              <a:t> </a:t>
-            </a:r>
-            <a:r>
-              <a:rPr lang="en-US" sz="2200" dirty="0" err="1">
-                <a:solidFill>
-                  <a:schemeClr val="tx1"/>
-                </a:solidFill>
-              </a:rPr>
-              <a:t>falsch</a:t>
-            </a:r>
-            <a:r>
-              <a:rPr lang="en-US" sz="2200" dirty="0">
-                <a:solidFill>
-                  <a:schemeClr val="tx1"/>
-                </a:solidFill>
-              </a:rPr>
-              <a:t> </a:t>
-            </a:r>
-            <a:r>
-              <a:rPr lang="en-US" sz="2200" dirty="0" err="1">
-                <a:solidFill>
-                  <a:schemeClr val="tx1"/>
-                </a:solidFill>
-              </a:rPr>
-              <a:t>übertragen</a:t>
-            </a:r>
-            <a:endParaRPr lang="en-US" sz="2200" dirty="0">
-              <a:solidFill>
-                <a:schemeClr val="tx1"/>
-              </a:solidFill>
-            </a:endParaRPr>
-          </a:p>
-          <a:p>
-            <a:pPr marL="457200" lvl="1" indent="0" defTabSz="457200">
-              <a:lnSpc>
-                <a:spcPct val="90000"/>
-              </a:lnSpc>
-              <a:spcAft>
-                <a:spcPts val="1000"/>
-              </a:spcAft>
-              <a:buClr>
-                <a:schemeClr val="tx1"/>
-              </a:buClr>
-              <a:buSzPct val="100000"/>
-              <a:buFont typeface="Arial"/>
-              <a:buChar char="•"/>
-            </a:pPr>
-            <a:endParaRPr lang="en-US" sz="900" dirty="0"/>
-          </a:p>
-          <a:p>
-            <a:pPr marL="971550" lvl="1" indent="-514350">
-              <a:lnSpc>
-                <a:spcPct val="150000"/>
-              </a:lnSpc>
-              <a:buClr>
-                <a:schemeClr val="tx1"/>
-              </a:buClr>
-              <a:buSzPts val="2800"/>
-              <a:buFont typeface="Arial"/>
-              <a:buChar char="•"/>
-            </a:pPr>
-            <a:r>
-              <a:rPr lang="en-US" sz="2200" dirty="0" err="1">
-                <a:solidFill>
-                  <a:schemeClr val="tx1"/>
-                </a:solidFill>
-              </a:rPr>
-              <a:t>Auswertung</a:t>
-            </a:r>
-            <a:r>
-              <a:rPr lang="en-US" sz="2200" dirty="0">
-                <a:solidFill>
-                  <a:schemeClr val="tx1"/>
-                </a:solidFill>
-              </a:rPr>
-              <a:t> der </a:t>
-            </a:r>
-            <a:r>
-              <a:rPr lang="en-US" sz="2200" dirty="0" err="1">
-                <a:solidFill>
-                  <a:schemeClr val="tx1"/>
-                </a:solidFill>
-              </a:rPr>
-              <a:t>Punkte</a:t>
-            </a:r>
-            <a:r>
-              <a:rPr lang="en-US" sz="2200" dirty="0">
-                <a:solidFill>
-                  <a:schemeClr val="tx1"/>
-                </a:solidFill>
-              </a:rPr>
-              <a:t> (</a:t>
-            </a:r>
-            <a:r>
-              <a:rPr lang="en-US" sz="2200" dirty="0" err="1">
-                <a:solidFill>
-                  <a:schemeClr val="tx1"/>
-                </a:solidFill>
-              </a:rPr>
-              <a:t>inkl</a:t>
-            </a:r>
-            <a:r>
-              <a:rPr lang="en-US" sz="2200" dirty="0">
-                <a:solidFill>
-                  <a:schemeClr val="tx1"/>
-                </a:solidFill>
-              </a:rPr>
-              <a:t>. </a:t>
-            </a:r>
-            <a:r>
-              <a:rPr lang="en-US" sz="2200" dirty="0" err="1">
-                <a:solidFill>
-                  <a:schemeClr val="tx1"/>
-                </a:solidFill>
-              </a:rPr>
-              <a:t>Bonuspunkte</a:t>
-            </a:r>
-            <a:r>
-              <a:rPr lang="en-US" sz="2200" dirty="0">
-                <a:solidFill>
-                  <a:schemeClr val="tx1"/>
-                </a:solidFill>
-              </a:rPr>
-              <a:t> </a:t>
-            </a:r>
-            <a:r>
-              <a:rPr lang="en-US" sz="2200" dirty="0" err="1">
-                <a:solidFill>
-                  <a:schemeClr val="tx1"/>
-                </a:solidFill>
-              </a:rPr>
-              <a:t>nach</a:t>
-            </a:r>
-            <a:r>
-              <a:rPr lang="en-US" sz="2200" dirty="0">
-                <a:solidFill>
-                  <a:schemeClr val="tx1"/>
-                </a:solidFill>
-              </a:rPr>
-              <a:t> Alter) </a:t>
-            </a:r>
-            <a:r>
-              <a:rPr lang="en-US" sz="2200" dirty="0" err="1">
-                <a:solidFill>
-                  <a:schemeClr val="tx1"/>
-                </a:solidFill>
-              </a:rPr>
-              <a:t>geschieht</a:t>
-            </a:r>
-            <a:r>
-              <a:rPr lang="en-US" sz="2200" dirty="0">
-                <a:solidFill>
-                  <a:schemeClr val="tx1"/>
-                </a:solidFill>
-              </a:rPr>
-              <a:t> </a:t>
-            </a:r>
-            <a:r>
-              <a:rPr lang="en-US" sz="2200" dirty="0" err="1">
-                <a:solidFill>
-                  <a:schemeClr val="tx1"/>
-                </a:solidFill>
-              </a:rPr>
-              <a:t>manuell</a:t>
-            </a:r>
-            <a:r>
-              <a:rPr lang="en-US" sz="2200" dirty="0">
-                <a:solidFill>
-                  <a:schemeClr val="tx1"/>
-                </a:solidFill>
-              </a:rPr>
-              <a:t>.</a:t>
-            </a:r>
-          </a:p>
-          <a:p>
-            <a:pPr lvl="1" indent="0">
-              <a:lnSpc>
-                <a:spcPct val="150000"/>
-              </a:lnSpc>
-              <a:buClr>
-                <a:schemeClr val="tx1"/>
-              </a:buClr>
-              <a:buSzPts val="2800"/>
-              <a:buNone/>
-            </a:pPr>
-            <a:r>
-              <a:rPr lang="en-US" sz="2200" dirty="0">
-                <a:solidFill>
-                  <a:schemeClr val="tx1"/>
-                </a:solidFill>
-              </a:rPr>
-              <a:t>	-&gt; </a:t>
-            </a:r>
-            <a:r>
-              <a:rPr lang="en-US" sz="2200" dirty="0" err="1">
-                <a:solidFill>
-                  <a:schemeClr val="tx1"/>
-                </a:solidFill>
-              </a:rPr>
-              <a:t>Rechnungsfehler</a:t>
-            </a:r>
-            <a:r>
-              <a:rPr lang="en-US" sz="2200" dirty="0">
-                <a:solidFill>
-                  <a:schemeClr val="tx1"/>
-                </a:solidFill>
-              </a:rPr>
-              <a:t> </a:t>
-            </a:r>
-            <a:r>
-              <a:rPr lang="en-US" sz="2200" dirty="0" err="1">
-                <a:solidFill>
-                  <a:schemeClr val="tx1"/>
-                </a:solidFill>
-              </a:rPr>
-              <a:t>können</a:t>
-            </a:r>
-            <a:r>
-              <a:rPr lang="en-US" sz="2200" dirty="0">
-                <a:solidFill>
-                  <a:schemeClr val="tx1"/>
-                </a:solidFill>
-              </a:rPr>
-              <a:t> </a:t>
-            </a:r>
-            <a:r>
-              <a:rPr lang="en-US" sz="2200" dirty="0" err="1">
-                <a:solidFill>
-                  <a:schemeClr val="tx1"/>
-                </a:solidFill>
-              </a:rPr>
-              <a:t>auftreten</a:t>
-            </a:r>
-            <a:r>
-              <a:rPr lang="en-US" sz="2200" dirty="0">
-                <a:solidFill>
-                  <a:schemeClr val="tx1"/>
-                </a:solidFill>
-              </a:rPr>
-              <a:t>.</a:t>
-            </a:r>
-          </a:p>
-          <a:p>
-            <a:pPr lvl="1" indent="0">
-              <a:lnSpc>
-                <a:spcPct val="150000"/>
-              </a:lnSpc>
-              <a:buClr>
-                <a:schemeClr val="tx1"/>
-              </a:buClr>
-              <a:buSzPts val="2800"/>
-              <a:buNone/>
-            </a:pPr>
-            <a:r>
-              <a:rPr lang="en-US" sz="2200" dirty="0">
-                <a:solidFill>
-                  <a:schemeClr val="tx1"/>
-                </a:solidFill>
-              </a:rPr>
-              <a:t>	-&gt; </a:t>
-            </a:r>
-            <a:r>
-              <a:rPr lang="en-US" sz="2200" dirty="0" err="1">
-                <a:solidFill>
-                  <a:schemeClr val="tx1"/>
-                </a:solidFill>
-              </a:rPr>
-              <a:t>Dauert</a:t>
-            </a:r>
-            <a:r>
-              <a:rPr lang="en-US" sz="2200" dirty="0">
-                <a:solidFill>
-                  <a:schemeClr val="tx1"/>
-                </a:solidFill>
-              </a:rPr>
-              <a:t> </a:t>
-            </a:r>
-            <a:r>
-              <a:rPr lang="en-US" sz="2200" dirty="0" err="1">
-                <a:solidFill>
-                  <a:schemeClr val="tx1"/>
-                </a:solidFill>
-              </a:rPr>
-              <a:t>relativ</a:t>
-            </a:r>
-            <a:r>
-              <a:rPr lang="en-US" sz="2200" dirty="0">
-                <a:solidFill>
-                  <a:schemeClr val="tx1"/>
-                </a:solidFill>
-              </a:rPr>
-              <a:t> </a:t>
-            </a:r>
-            <a:r>
-              <a:rPr lang="en-US" sz="2200" dirty="0" err="1">
-                <a:solidFill>
-                  <a:schemeClr val="tx1"/>
-                </a:solidFill>
-              </a:rPr>
-              <a:t>lange</a:t>
-            </a:r>
-            <a:r>
-              <a:rPr lang="en-US" sz="2200" dirty="0">
-                <a:solidFill>
-                  <a:schemeClr val="tx1"/>
-                </a:solidFill>
-              </a:rPr>
-              <a:t> bis die </a:t>
-            </a:r>
-            <a:r>
-              <a:rPr lang="en-US" sz="2200" dirty="0" err="1">
-                <a:solidFill>
-                  <a:schemeClr val="tx1"/>
-                </a:solidFill>
-              </a:rPr>
-              <a:t>Resultate</a:t>
-            </a:r>
-            <a:r>
-              <a:rPr lang="en-US" sz="2200" dirty="0">
-                <a:solidFill>
-                  <a:schemeClr val="tx1"/>
-                </a:solidFill>
-              </a:rPr>
               <a:t> für die </a:t>
             </a:r>
             <a:r>
-              <a:rPr lang="en-US" sz="2200" dirty="0" err="1">
+              <a:rPr lang="de-CH" sz="2200" dirty="0">
                 <a:solidFill>
                   <a:schemeClr val="tx1"/>
                 </a:solidFill>
@@ -16519,13 +16692,72 @@
               <a:buSzPts val="2000"/>
             </a:pPr>
             <a:r>
-              <a:rPr lang="de-CH" sz="1400"/>
+              <a:rPr lang="de-CH" sz="1400" dirty="0"/>
               <a:t>Präsentation von C. Müller</a:t>
             </a:r>
-            <a:endParaRPr lang="de-CH" sz="1400" dirty="0"/>
           </a:p>
         </p:txBody>
       </p:sp>
+      <p:pic>
+        <p:nvPicPr>
+          <p:cNvPr id="3" name="Grafik 2">
+            <a:extLst>
+              <a:ext uri="{FF2B5EF4-FFF2-40B4-BE49-F238E27FC236}">
+                <a16:creationId xmlns:a16="http://schemas.microsoft.com/office/drawing/2014/main" id="{43EBC877-8224-21BE-9134-527EFA1CC66D}"/>
+              </a:ext>
+            </a:extLst>
+          </p:cNvPr>
+          <p:cNvPicPr>
+            <a:picLocks noChangeAspect="1"/>
+          </p:cNvPicPr>
+          <p:nvPr/>
+        </p:nvPicPr>
+        <p:blipFill>
+          <a:blip r:embed="rId3"/>
+          <a:stretch>
+            <a:fillRect/>
+          </a:stretch>
+        </p:blipFill>
+        <p:spPr>
+          <a:xfrm>
+            <a:off x="2290029" y="2754561"/>
+            <a:ext cx="2058072" cy="1026070"/>
+          </a:xfrm>
+          <a:prstGeom prst="rect">
+            <a:avLst/>
+          </a:prstGeom>
+        </p:spPr>
+      </p:pic>
+      <p:pic>
+        <p:nvPicPr>
+          <p:cNvPr id="5" name="Grafik 4">
+            <a:extLst>
+              <a:ext uri="{FF2B5EF4-FFF2-40B4-BE49-F238E27FC236}">
+                <a16:creationId xmlns:a16="http://schemas.microsoft.com/office/drawing/2014/main" id="{EF6BFA6F-FC5F-AEF5-4BFD-8787E2CDB339}"/>
+              </a:ext>
+            </a:extLst>
+          </p:cNvPr>
+          <p:cNvPicPr>
+            <a:picLocks noChangeAspect="1"/>
+          </p:cNvPicPr>
+          <p:nvPr/>
+        </p:nvPicPr>
+        <p:blipFill>
+          <a:blip r:embed="rId4"/>
+          <a:stretch>
+            <a:fillRect/>
+          </a:stretch>
+        </p:blipFill>
+        <p:spPr>
+          <a:xfrm>
+            <a:off x="2290029" y="4545979"/>
+            <a:ext cx="2541110" cy="912954"/>
+          </a:xfrm>
+          <a:prstGeom prst="rect">
+            <a:avLst/>
+          </a:prstGeom>
+        </p:spPr>
+      </p:pic>
     </p:spTree>
     <p:extLst>
       <p:ext uri="{BB962C8B-B14F-4D97-AF65-F5344CB8AC3E}">
@@ -17701,6 +17933,32 @@
                 <a:cs typeface="Calibri"/>
               </a:rPr>
               <a:t>Timing-Probleme mit den asynchronen Aufrufe</a:t>
+            </a:r>
+          </a:p>
+          <a:p>
+            <a:pPr marL="177800" lvl="1" indent="0" defTabSz="457200">
+              <a:lnSpc>
+                <a:spcPct val="150000"/>
+              </a:lnSpc>
+              <a:buClr>
+                <a:schemeClr val="tx1"/>
+              </a:buClr>
+              <a:buSzPts val="2800"/>
+              <a:buNone/>
+            </a:pPr>
+            <a:r>
+              <a:rPr lang="de-DE" sz="2200">
+                <a:latin typeface="Calibri"/>
+                <a:cs typeface="Calibri"/>
+              </a:rPr>
+              <a:t>		-&gt; </a:t>
+            </a:r>
+            <a:r>
+              <a:rPr lang="de-DE" sz="2200" dirty="0">
+                <a:latin typeface="Calibri"/>
+                <a:cs typeface="Calibri"/>
+              </a:rPr>
+              <a:t>Doppelte Einträge</a:t>
             </a:r>
           </a:p>
           <a:p>

</xml_diff>